<commit_message>
final commit before submitting
</commit_message>
<xml_diff>
--- a/Causing Confusion in The Chinese Room.pptx
+++ b/Causing Confusion in The Chinese Room.pptx
@@ -153,7 +153,7 @@
 <file path=ppt/revisionInfo.xml><?xml version="1.0" encoding="utf-8"?>
 <p1510:revInfo xmlns:a="http://schemas.openxmlformats.org/drawingml/2006/main" xmlns:r="http://schemas.openxmlformats.org/officeDocument/2006/relationships" xmlns:p1510="http://schemas.microsoft.com/office/powerpoint/2015/10/main">
   <p1510:revLst>
-    <p1510:client id="{3482D43A-F9E6-4372-80EF-8F2C5B4A56E6}" v="2224" dt="2024-08-06T22:35:15.729"/>
+    <p1510:client id="{3482D43A-F9E6-4372-80EF-8F2C5B4A56E6}" v="2392" dt="2024-08-07T00:53:34.826"/>
   </p1510:revLst>
 </p1510:revInfo>
 </file>
@@ -163,7 +163,7 @@
   <pc:docChgLst>
     <pc:chgData name="Nick Speelman" userId="be53a9c7-f211-4f5d-8a48-53fc06072468" providerId="ADAL" clId="{3482D43A-F9E6-4372-80EF-8F2C5B4A56E6}"/>
     <pc:docChg chg="undo custSel addSld delSld modSld sldOrd">
-      <pc:chgData name="Nick Speelman" userId="be53a9c7-f211-4f5d-8a48-53fc06072468" providerId="ADAL" clId="{3482D43A-F9E6-4372-80EF-8F2C5B4A56E6}" dt="2024-08-06T22:35:43.356" v="4766" actId="1076"/>
+      <pc:chgData name="Nick Speelman" userId="be53a9c7-f211-4f5d-8a48-53fc06072468" providerId="ADAL" clId="{3482D43A-F9E6-4372-80EF-8F2C5B4A56E6}" dt="2024-08-07T01:24:46.169" v="5000" actId="20577"/>
       <pc:docMkLst>
         <pc:docMk/>
       </pc:docMkLst>
@@ -182,7 +182,21 @@
         </pc:sldMkLst>
       </pc:sldChg>
       <pc:sldChg chg="modNotesTx">
-        <pc:chgData name="Nick Speelman" userId="be53a9c7-f211-4f5d-8a48-53fc06072468" providerId="ADAL" clId="{3482D43A-F9E6-4372-80EF-8F2C5B4A56E6}" dt="2024-08-06T20:39:47.307" v="2527" actId="20577"/>
+        <pc:chgData name="Nick Speelman" userId="be53a9c7-f211-4f5d-8a48-53fc06072468" providerId="ADAL" clId="{3482D43A-F9E6-4372-80EF-8F2C5B4A56E6}" dt="2024-08-07T01:24:46.169" v="5000" actId="20577"/>
+        <pc:sldMkLst>
+          <pc:docMk/>
+          <pc:sldMk cId="643338680" sldId="260"/>
+        </pc:sldMkLst>
+      </pc:sldChg>
+      <pc:sldChg chg="add del">
+        <pc:chgData name="Nick Speelman" userId="be53a9c7-f211-4f5d-8a48-53fc06072468" providerId="ADAL" clId="{3482D43A-F9E6-4372-80EF-8F2C5B4A56E6}" dt="2024-08-07T00:18:52.782" v="4772" actId="47"/>
+        <pc:sldMkLst>
+          <pc:docMk/>
+          <pc:sldMk cId="1545823891" sldId="261"/>
+        </pc:sldMkLst>
+      </pc:sldChg>
+      <pc:sldChg chg="modNotesTx">
+        <pc:chgData name="Nick Speelman" userId="be53a9c7-f211-4f5d-8a48-53fc06072468" providerId="ADAL" clId="{3482D43A-F9E6-4372-80EF-8F2C5B4A56E6}" dt="2024-08-07T01:20:39.588" v="4960" actId="20577"/>
         <pc:sldMkLst>
           <pc:docMk/>
           <pc:sldMk cId="292658640" sldId="264"/>
@@ -202,8 +216,23 @@
           <pc:sldMk cId="3764760180" sldId="268"/>
         </pc:sldMkLst>
       </pc:sldChg>
-      <pc:sldChg chg="modSp mod modNotesTx">
-        <pc:chgData name="Nick Speelman" userId="be53a9c7-f211-4f5d-8a48-53fc06072468" providerId="ADAL" clId="{3482D43A-F9E6-4372-80EF-8F2C5B4A56E6}" dt="2024-08-06T20:45:09.272" v="3207" actId="20577"/>
+      <pc:sldChg chg="modSp add del">
+        <pc:chgData name="Nick Speelman" userId="be53a9c7-f211-4f5d-8a48-53fc06072468" providerId="ADAL" clId="{3482D43A-F9E6-4372-80EF-8F2C5B4A56E6}" dt="2024-08-07T00:20:03.240" v="4774" actId="33524"/>
+        <pc:sldMkLst>
+          <pc:docMk/>
+          <pc:sldMk cId="2840712891" sldId="270"/>
+        </pc:sldMkLst>
+        <pc:spChg chg="mod">
+          <ac:chgData name="Nick Speelman" userId="be53a9c7-f211-4f5d-8a48-53fc06072468" providerId="ADAL" clId="{3482D43A-F9E6-4372-80EF-8F2C5B4A56E6}" dt="2024-08-07T00:20:03.240" v="4774" actId="33524"/>
+          <ac:spMkLst>
+            <pc:docMk/>
+            <pc:sldMk cId="2840712891" sldId="270"/>
+            <ac:spMk id="2" creationId="{DC74D170-4FBB-A716-D9B8-652F1265C3E1}"/>
+          </ac:spMkLst>
+        </pc:spChg>
+      </pc:sldChg>
+      <pc:sldChg chg="modSp add del mod modNotesTx">
+        <pc:chgData name="Nick Speelman" userId="be53a9c7-f211-4f5d-8a48-53fc06072468" providerId="ADAL" clId="{3482D43A-F9E6-4372-80EF-8F2C5B4A56E6}" dt="2024-08-07T00:18:48.935" v="4770" actId="47"/>
         <pc:sldMkLst>
           <pc:docMk/>
           <pc:sldMk cId="3681119920" sldId="271"/>
@@ -263,14 +292,22 @@
           </ac:spMkLst>
         </pc:spChg>
       </pc:sldChg>
-      <pc:sldChg chg="modSp modNotesTx">
-        <pc:chgData name="Nick Speelman" userId="be53a9c7-f211-4f5d-8a48-53fc06072468" providerId="ADAL" clId="{3482D43A-F9E6-4372-80EF-8F2C5B4A56E6}" dt="2024-08-06T21:48:57.626" v="4751" actId="20577"/>
+      <pc:sldChg chg="addSp modSp mod modAnim modNotesTx">
+        <pc:chgData name="Nick Speelman" userId="be53a9c7-f211-4f5d-8a48-53fc06072468" providerId="ADAL" clId="{3482D43A-F9E6-4372-80EF-8F2C5B4A56E6}" dt="2024-08-07T00:39:58.790" v="4896" actId="255"/>
         <pc:sldMkLst>
           <pc:docMk/>
           <pc:sldMk cId="2444292967" sldId="275"/>
         </pc:sldMkLst>
+        <pc:spChg chg="add mod">
+          <ac:chgData name="Nick Speelman" userId="be53a9c7-f211-4f5d-8a48-53fc06072468" providerId="ADAL" clId="{3482D43A-F9E6-4372-80EF-8F2C5B4A56E6}" dt="2024-08-07T00:39:58.790" v="4896" actId="255"/>
+          <ac:spMkLst>
+            <pc:docMk/>
+            <pc:sldMk cId="2444292967" sldId="275"/>
+            <ac:spMk id="2" creationId="{858DB8BF-AE50-A8AD-8590-E8053E707A6E}"/>
+          </ac:spMkLst>
+        </pc:spChg>
         <pc:spChg chg="mod">
-          <ac:chgData name="Nick Speelman" userId="be53a9c7-f211-4f5d-8a48-53fc06072468" providerId="ADAL" clId="{3482D43A-F9E6-4372-80EF-8F2C5B4A56E6}" dt="2024-08-06T19:29:38.463" v="142" actId="20577"/>
+          <ac:chgData name="Nick Speelman" userId="be53a9c7-f211-4f5d-8a48-53fc06072468" providerId="ADAL" clId="{3482D43A-F9E6-4372-80EF-8F2C5B4A56E6}" dt="2024-08-07T00:38:15.654" v="4775" actId="21"/>
           <ac:spMkLst>
             <pc:docMk/>
             <pc:sldMk cId="2444292967" sldId="275"/>
@@ -289,6 +326,21 @@
           <ac:spMkLst>
             <pc:docMk/>
             <pc:sldMk cId="77261263" sldId="276"/>
+            <ac:spMk id="5" creationId="{D52F5335-6BA7-04EC-9FF0-ABF24D77ABAD}"/>
+          </ac:spMkLst>
+        </pc:spChg>
+      </pc:sldChg>
+      <pc:sldChg chg="modSp">
+        <pc:chgData name="Nick Speelman" userId="be53a9c7-f211-4f5d-8a48-53fc06072468" providerId="ADAL" clId="{3482D43A-F9E6-4372-80EF-8F2C5B4A56E6}" dt="2024-08-07T00:41:39.158" v="4909" actId="20577"/>
+        <pc:sldMkLst>
+          <pc:docMk/>
+          <pc:sldMk cId="3329445343" sldId="277"/>
+        </pc:sldMkLst>
+        <pc:spChg chg="mod">
+          <ac:chgData name="Nick Speelman" userId="be53a9c7-f211-4f5d-8a48-53fc06072468" providerId="ADAL" clId="{3482D43A-F9E6-4372-80EF-8F2C5B4A56E6}" dt="2024-08-07T00:41:39.158" v="4909" actId="20577"/>
+          <ac:spMkLst>
+            <pc:docMk/>
+            <pc:sldMk cId="3329445343" sldId="277"/>
             <ac:spMk id="5" creationId="{D52F5335-6BA7-04EC-9FF0-ABF24D77ABAD}"/>
           </ac:spMkLst>
         </pc:spChg>
@@ -410,13 +462,13 @@
         </pc:spChg>
       </pc:sldChg>
       <pc:sldChg chg="modSp add modAnim">
-        <pc:chgData name="Nick Speelman" userId="be53a9c7-f211-4f5d-8a48-53fc06072468" providerId="ADAL" clId="{3482D43A-F9E6-4372-80EF-8F2C5B4A56E6}" dt="2024-08-06T19:59:57.835" v="732" actId="255"/>
+        <pc:chgData name="Nick Speelman" userId="be53a9c7-f211-4f5d-8a48-53fc06072468" providerId="ADAL" clId="{3482D43A-F9E6-4372-80EF-8F2C5B4A56E6}" dt="2024-08-07T00:47:24.941" v="4928" actId="255"/>
         <pc:sldMkLst>
           <pc:docMk/>
           <pc:sldMk cId="253603109" sldId="282"/>
         </pc:sldMkLst>
         <pc:spChg chg="mod">
-          <ac:chgData name="Nick Speelman" userId="be53a9c7-f211-4f5d-8a48-53fc06072468" providerId="ADAL" clId="{3482D43A-F9E6-4372-80EF-8F2C5B4A56E6}" dt="2024-08-06T19:59:57.835" v="732" actId="255"/>
+          <ac:chgData name="Nick Speelman" userId="be53a9c7-f211-4f5d-8a48-53fc06072468" providerId="ADAL" clId="{3482D43A-F9E6-4372-80EF-8F2C5B4A56E6}" dt="2024-08-07T00:47:24.941" v="4928" actId="255"/>
           <ac:spMkLst>
             <pc:docMk/>
             <pc:sldMk cId="253603109" sldId="282"/>
@@ -425,13 +477,13 @@
         </pc:spChg>
       </pc:sldChg>
       <pc:sldChg chg="addSp delSp modSp add mod delAnim modAnim">
-        <pc:chgData name="Nick Speelman" userId="be53a9c7-f211-4f5d-8a48-53fc06072468" providerId="ADAL" clId="{3482D43A-F9E6-4372-80EF-8F2C5B4A56E6}" dt="2024-08-06T20:03:59.325" v="993"/>
+        <pc:chgData name="Nick Speelman" userId="be53a9c7-f211-4f5d-8a48-53fc06072468" providerId="ADAL" clId="{3482D43A-F9E6-4372-80EF-8F2C5B4A56E6}" dt="2024-08-07T00:48:11.745" v="4935" actId="20577"/>
         <pc:sldMkLst>
           <pc:docMk/>
           <pc:sldMk cId="1533836298" sldId="283"/>
         </pc:sldMkLst>
         <pc:spChg chg="add mod">
-          <ac:chgData name="Nick Speelman" userId="be53a9c7-f211-4f5d-8a48-53fc06072468" providerId="ADAL" clId="{3482D43A-F9E6-4372-80EF-8F2C5B4A56E6}" dt="2024-08-06T20:03:34.463" v="989" actId="255"/>
+          <ac:chgData name="Nick Speelman" userId="be53a9c7-f211-4f5d-8a48-53fc06072468" providerId="ADAL" clId="{3482D43A-F9E6-4372-80EF-8F2C5B4A56E6}" dt="2024-08-07T00:48:11.745" v="4935" actId="20577"/>
           <ac:spMkLst>
             <pc:docMk/>
             <pc:sldMk cId="1533836298" sldId="283"/>
@@ -579,13 +631,13 @@
         </pc:spChg>
       </pc:sldChg>
       <pc:sldChg chg="modSp add modAnim">
-        <pc:chgData name="Nick Speelman" userId="be53a9c7-f211-4f5d-8a48-53fc06072468" providerId="ADAL" clId="{3482D43A-F9E6-4372-80EF-8F2C5B4A56E6}" dt="2024-08-06T20:29:30.872" v="1992"/>
+        <pc:chgData name="Nick Speelman" userId="be53a9c7-f211-4f5d-8a48-53fc06072468" providerId="ADAL" clId="{3482D43A-F9E6-4372-80EF-8F2C5B4A56E6}" dt="2024-08-07T00:53:34.826" v="4944" actId="20577"/>
         <pc:sldMkLst>
           <pc:docMk/>
           <pc:sldMk cId="3824399417" sldId="289"/>
         </pc:sldMkLst>
         <pc:spChg chg="mod">
-          <ac:chgData name="Nick Speelman" userId="be53a9c7-f211-4f5d-8a48-53fc06072468" providerId="ADAL" clId="{3482D43A-F9E6-4372-80EF-8F2C5B4A56E6}" dt="2024-08-06T20:29:19.058" v="1989" actId="255"/>
+          <ac:chgData name="Nick Speelman" userId="be53a9c7-f211-4f5d-8a48-53fc06072468" providerId="ADAL" clId="{3482D43A-F9E6-4372-80EF-8F2C5B4A56E6}" dt="2024-08-07T00:53:34.826" v="4944" actId="20577"/>
           <ac:spMkLst>
             <pc:docMk/>
             <pc:sldMk cId="3824399417" sldId="289"/>
@@ -2450,6 +2502,93 @@
           <a:p>
             <a:r>
               <a:rPr lang="en-US" dirty="0"/>
+              <a:t>I’ve tried to get a lot of scores in the hopes that the wisdom of crowds would approximate an objective pass/fail</a:t>
+            </a:r>
+          </a:p>
+        </p:txBody>
+      </p:sp>
+      <p:sp>
+        <p:nvSpPr>
+          <p:cNvPr id="4" name="Slide Number Placeholder 3"/>
+          <p:cNvSpPr>
+            <a:spLocks noGrp="1"/>
+          </p:cNvSpPr>
+          <p:nvPr>
+            <p:ph type="sldNum" sz="quarter" idx="5"/>
+          </p:nvPr>
+        </p:nvSpPr>
+        <p:spPr/>
+        <p:txBody>
+          <a:bodyPr/>
+          <a:lstStyle/>
+          <a:p>
+            <a:fld id="{3E71ED60-034F-453E-A170-8B332E4706A7}" type="slidenum">
+              <a:rPr lang="en-US" smtClean="0"/>
+              <a:t>18</a:t>
+            </a:fld>
+            <a:endParaRPr lang="en-US"/>
+          </a:p>
+        </p:txBody>
+      </p:sp>
+    </p:spTree>
+    <p:extLst>
+      <p:ext uri="{BB962C8B-B14F-4D97-AF65-F5344CB8AC3E}">
+        <p14:creationId xmlns:p14="http://schemas.microsoft.com/office/powerpoint/2010/main" val="2088953230"/>
+      </p:ext>
+    </p:extLst>
+  </p:cSld>
+  <p:clrMapOvr>
+    <a:masterClrMapping/>
+  </p:clrMapOvr>
+</p:notes>
+</file>
+
+<file path=ppt/notesSlides/notesSlide11.xml><?xml version="1.0" encoding="utf-8"?>
+<p:notes xmlns:a="http://schemas.openxmlformats.org/drawingml/2006/main" xmlns:r="http://schemas.openxmlformats.org/officeDocument/2006/relationships" xmlns:p="http://schemas.openxmlformats.org/presentationml/2006/main">
+  <p:cSld>
+    <p:spTree>
+      <p:nvGrpSpPr>
+        <p:cNvPr id="1" name=""/>
+        <p:cNvGrpSpPr/>
+        <p:nvPr/>
+      </p:nvGrpSpPr>
+      <p:grpSpPr>
+        <a:xfrm>
+          <a:off x="0" y="0"/>
+          <a:ext cx="0" cy="0"/>
+          <a:chOff x="0" y="0"/>
+          <a:chExt cx="0" cy="0"/>
+        </a:xfrm>
+      </p:grpSpPr>
+      <p:sp>
+        <p:nvSpPr>
+          <p:cNvPr id="2" name="Slide Image Placeholder 1"/>
+          <p:cNvSpPr>
+            <a:spLocks noGrp="1" noRot="1" noChangeAspect="1"/>
+          </p:cNvSpPr>
+          <p:nvPr>
+            <p:ph type="sldImg"/>
+          </p:nvPr>
+        </p:nvSpPr>
+        <p:spPr/>
+      </p:sp>
+      <p:sp>
+        <p:nvSpPr>
+          <p:cNvPr id="3" name="Notes Placeholder 2"/>
+          <p:cNvSpPr>
+            <a:spLocks noGrp="1"/>
+          </p:cNvSpPr>
+          <p:nvPr>
+            <p:ph type="body" idx="1"/>
+          </p:nvPr>
+        </p:nvSpPr>
+        <p:spPr/>
+        <p:txBody>
+          <a:bodyPr/>
+          <a:lstStyle/>
+          <a:p>
+            <a:r>
+              <a:rPr lang="en-US" dirty="0"/>
               <a:t>The scale on which the responses were rated</a:t>
             </a:r>
           </a:p>
@@ -2630,7 +2769,7 @@
           <a:p>
             <a:r>
               <a:rPr lang="en-US" dirty="0"/>
-              <a:t>GPT – 4 scored 50%</a:t>
+              <a:t>UC Sand Diego GPT – 4 scored 50%</a:t>
             </a:r>
           </a:p>
           <a:p>
@@ -2821,68 +2960,7 @@
           <a:p>
             <a:r>
               <a:rPr lang="en-US" dirty="0"/>
-              <a:t>There is a man who speaks English but no Chinese in a room.</a:t>
-            </a:r>
-          </a:p>
-          <a:p>
-            <a:r>
-              <a:rPr lang="en-US" dirty="0"/>
-              <a:t>Inside the room is a box of notes written in Chinese</a:t>
-            </a:r>
-          </a:p>
-          <a:p>
-            <a:r>
-              <a:rPr lang="en-US" dirty="0"/>
-              <a:t>And an instruction manual written in </a:t>
-            </a:r>
-            <a:r>
-              <a:rPr lang="en-US" dirty="0" err="1"/>
-              <a:t>ENglish</a:t>
-            </a:r>
-            <a:endParaRPr lang="en-US" dirty="0"/>
-          </a:p>
-          <a:p>
-            <a:r>
-              <a:rPr lang="en-US" dirty="0"/>
-              <a:t>Outside the room is a woman who speaks Chinese</a:t>
-            </a:r>
-          </a:p>
-          <a:p>
-            <a:r>
-              <a:rPr lang="en-US" dirty="0"/>
-              <a:t>She slides a </a:t>
-            </a:r>
-            <a:r>
-              <a:rPr lang="en-US" dirty="0" err="1"/>
-              <a:t>notein</a:t>
-            </a:r>
-            <a:r>
-              <a:rPr lang="en-US" dirty="0"/>
-              <a:t> Chinese  under the door into the room</a:t>
-            </a:r>
-          </a:p>
-          <a:p>
-            <a:r>
-              <a:rPr lang="en-US" dirty="0"/>
-              <a:t>The man looks up the note in his instruction manual</a:t>
-            </a:r>
-          </a:p>
-          <a:p>
-            <a:r>
-              <a:rPr lang="en-US" dirty="0"/>
-              <a:t>Then finds the note it told him to find in the box of notes</a:t>
-            </a:r>
-          </a:p>
-          <a:p>
-            <a:r>
-              <a:rPr lang="en-US" dirty="0"/>
-              <a:t>He passes that note back under the door</a:t>
-            </a:r>
-          </a:p>
-          <a:p>
-            <a:r>
-              <a:rPr lang="en-US" dirty="0"/>
-              <a:t>The woman reads the note, it makes sense and she assumes there must be someone who speaks Chinese inside the room </a:t>
+              <a:t>I’m going to try to get into that today</a:t>
             </a:r>
           </a:p>
         </p:txBody>
@@ -2904,7 +2982,7 @@
           <a:p>
             <a:fld id="{3E71ED60-034F-453E-A170-8B332E4706A7}" type="slidenum">
               <a:rPr lang="en-US" smtClean="0"/>
-              <a:t>10</a:t>
+              <a:t>7</a:t>
             </a:fld>
             <a:endParaRPr lang="en-US"/>
           </a:p>
@@ -2913,7 +2991,7 @@
     </p:spTree>
     <p:extLst>
       <p:ext uri="{BB962C8B-B14F-4D97-AF65-F5344CB8AC3E}">
-        <p14:creationId xmlns:p14="http://schemas.microsoft.com/office/powerpoint/2010/main" val="1463396321"/>
+        <p14:creationId xmlns:p14="http://schemas.microsoft.com/office/powerpoint/2010/main" val="3601606740"/>
       </p:ext>
     </p:extLst>
   </p:cSld>
@@ -2969,43 +3047,68 @@
           <a:p>
             <a:r>
               <a:rPr lang="en-US" dirty="0"/>
-              <a:t>Systems Reply – The man is just the CPU; the room as whole does “understand”</a:t>
-            </a:r>
-          </a:p>
-          <a:p>
+              <a:t>There is a man who speaks English but no Chinese in a room.</a:t>
+            </a:r>
+          </a:p>
+          <a:p>
+            <a:r>
+              <a:rPr lang="en-US" dirty="0"/>
+              <a:t>Inside the room is a box of notes written in Chinese</a:t>
+            </a:r>
+          </a:p>
+          <a:p>
+            <a:r>
+              <a:rPr lang="en-US" dirty="0"/>
+              <a:t>And an instruction manual written in </a:t>
+            </a:r>
+            <a:r>
+              <a:rPr lang="en-US" dirty="0" err="1"/>
+              <a:t>ENglish</a:t>
+            </a:r>
             <a:endParaRPr lang="en-US" dirty="0"/>
           </a:p>
           <a:p>
             <a:r>
               <a:rPr lang="en-US" dirty="0"/>
-              <a:t>Robot Reply – Understanding is a result of embodiment, embedding an AI within a body may give rise to understanding</a:t>
-            </a:r>
-          </a:p>
-          <a:p>
-            <a:endParaRPr lang="en-US" dirty="0"/>
+              <a:t>Outside the room is a woman who speaks Chinese</a:t>
+            </a:r>
           </a:p>
           <a:p>
             <a:r>
               <a:rPr lang="en-US" dirty="0"/>
-              <a:t>Brain Simulator Reply – If we simulate a brain, couldn’t that brain understand Chinese?</a:t>
-            </a:r>
-          </a:p>
-          <a:p>
-            <a:endParaRPr lang="en-US" dirty="0"/>
-          </a:p>
-          <a:p>
+              <a:t>She slides a </a:t>
+            </a:r>
+            <a:r>
+              <a:rPr lang="en-US" dirty="0" err="1"/>
+              <a:t>notein</a:t>
+            </a:r>
             <a:r>
               <a:rPr lang="en-US" dirty="0"/>
-              <a:t>Other Minds – How can you know anyone actually understands Chinese</a:t>
-            </a:r>
-          </a:p>
-          <a:p>
-            <a:endParaRPr lang="en-US" dirty="0"/>
+              <a:t> Chinese  under the door into the room</a:t>
+            </a:r>
           </a:p>
           <a:p>
             <a:r>
               <a:rPr lang="en-US" dirty="0"/>
-              <a:t>Intuition Reply – The idea that some things can think and some things can’t is based entirely on intuition, no real evidence</a:t>
+              <a:t>The man looks up the note in his instruction manual</a:t>
+            </a:r>
+          </a:p>
+          <a:p>
+            <a:r>
+              <a:rPr lang="en-US" dirty="0"/>
+              <a:t>Then finds the note it told him to find in the box of notes</a:t>
+            </a:r>
+          </a:p>
+          <a:p>
+            <a:r>
+              <a:rPr lang="en-US" dirty="0"/>
+              <a:t>He passes that note back under the door</a:t>
+            </a:r>
+          </a:p>
+          <a:p>
+            <a:r>
+              <a:rPr lang="en-US" dirty="0"/>
+              <a:t>The woman reads the note, it makes sense and she assumes there must be someone who speaks Chinese inside the room </a:t>
             </a:r>
           </a:p>
         </p:txBody>
@@ -3027,7 +3130,7 @@
           <a:p>
             <a:fld id="{3E71ED60-034F-453E-A170-8B332E4706A7}" type="slidenum">
               <a:rPr lang="en-US" smtClean="0"/>
-              <a:t>12</a:t>
+              <a:t>10</a:t>
             </a:fld>
             <a:endParaRPr lang="en-US"/>
           </a:p>
@@ -3036,7 +3139,7 @@
     </p:spTree>
     <p:extLst>
       <p:ext uri="{BB962C8B-B14F-4D97-AF65-F5344CB8AC3E}">
-        <p14:creationId xmlns:p14="http://schemas.microsoft.com/office/powerpoint/2010/main" val="977024395"/>
+        <p14:creationId xmlns:p14="http://schemas.microsoft.com/office/powerpoint/2010/main" val="1463396321"/>
       </p:ext>
     </p:extLst>
   </p:cSld>
@@ -3092,7 +3195,7 @@
           <a:p>
             <a:r>
               <a:rPr lang="en-US" dirty="0"/>
-              <a:t>Searle claims that the formal version of the CRA has never been addressed</a:t>
+              <a:t>Systems Reply – The man is just the CPU; the room as whole does “understand”</a:t>
             </a:r>
           </a:p>
           <a:p>
@@ -3101,7 +3204,7 @@
           <a:p>
             <a:r>
               <a:rPr lang="en-US" dirty="0"/>
-              <a:t>But I think #3 is far from self evident</a:t>
+              <a:t>Robot Reply – Understanding is a result of embodiment, embedding an AI within a body may give rise to understanding</a:t>
             </a:r>
           </a:p>
           <a:p>
@@ -3110,7 +3213,25 @@
           <a:p>
             <a:r>
               <a:rPr lang="en-US" dirty="0"/>
-              <a:t>How do we know understanding can’t arise from pure syntax? </a:t>
+              <a:t>Brain Simulator Reply – If we simulate a brain, couldn’t that brain understand Chinese?</a:t>
+            </a:r>
+          </a:p>
+          <a:p>
+            <a:endParaRPr lang="en-US" dirty="0"/>
+          </a:p>
+          <a:p>
+            <a:r>
+              <a:rPr lang="en-US" dirty="0"/>
+              <a:t>Other Minds – How can you know anyone actually understands Chinese</a:t>
+            </a:r>
+          </a:p>
+          <a:p>
+            <a:endParaRPr lang="en-US" dirty="0"/>
+          </a:p>
+          <a:p>
+            <a:r>
+              <a:rPr lang="en-US" dirty="0"/>
+              <a:t>Intuition Reply – The idea that some things can think and some things can’t is based entirely on intuition, no real evidence</a:t>
             </a:r>
           </a:p>
         </p:txBody>
@@ -3132,7 +3253,7 @@
           <a:p>
             <a:fld id="{3E71ED60-034F-453E-A170-8B332E4706A7}" type="slidenum">
               <a:rPr lang="en-US" smtClean="0"/>
-              <a:t>13</a:t>
+              <a:t>12</a:t>
             </a:fld>
             <a:endParaRPr lang="en-US"/>
           </a:p>
@@ -3141,7 +3262,7 @@
     </p:spTree>
     <p:extLst>
       <p:ext uri="{BB962C8B-B14F-4D97-AF65-F5344CB8AC3E}">
-        <p14:creationId xmlns:p14="http://schemas.microsoft.com/office/powerpoint/2010/main" val="3283837592"/>
+        <p14:creationId xmlns:p14="http://schemas.microsoft.com/office/powerpoint/2010/main" val="977024395"/>
       </p:ext>
     </p:extLst>
   </p:cSld>
@@ -3197,7 +3318,7 @@
           <a:p>
             <a:r>
               <a:rPr lang="en-US" dirty="0"/>
-              <a:t>The are just extremely sophisticated statistical models that mimic human speech</a:t>
+              <a:t>Searle claims that the formal version of the CRA has never been addressed</a:t>
             </a:r>
           </a:p>
           <a:p>
@@ -3206,29 +3327,16 @@
           <a:p>
             <a:r>
               <a:rPr lang="en-US" dirty="0"/>
-              <a:t>A study where they asked Google’s BERT LLM to make logical inferences found that it made the correct inference 77% of the time</a:t>
-            </a:r>
+              <a:t>But I think #3 is far from self evident</a:t>
+            </a:r>
+          </a:p>
+          <a:p>
+            <a:endParaRPr lang="en-US" dirty="0"/>
           </a:p>
           <a:p>
             <a:r>
               <a:rPr lang="en-US" dirty="0"/>
-              <a:t>But when the finessed the prompts to remove simple </a:t>
-            </a:r>
-            <a:r>
-              <a:rPr lang="en-US" dirty="0" err="1"/>
-              <a:t>syntactice</a:t>
-            </a:r>
-            <a:r>
-              <a:rPr lang="en-US" dirty="0"/>
-              <a:t> clues like negating claims, </a:t>
-            </a:r>
-            <a:r>
-              <a:rPr lang="en-US" dirty="0" err="1"/>
-              <a:t>accuracty</a:t>
-            </a:r>
-            <a:r>
-              <a:rPr lang="en-US" dirty="0"/>
-              <a:t> dropped to 77%</a:t>
+              <a:t>How do we know understanding can’t arise from pure syntax? </a:t>
             </a:r>
           </a:p>
         </p:txBody>
@@ -3250,7 +3358,7 @@
           <a:p>
             <a:fld id="{3E71ED60-034F-453E-A170-8B332E4706A7}" type="slidenum">
               <a:rPr lang="en-US" smtClean="0"/>
-              <a:t>14</a:t>
+              <a:t>13</a:t>
             </a:fld>
             <a:endParaRPr lang="en-US"/>
           </a:p>
@@ -3259,7 +3367,7 @@
     </p:spTree>
     <p:extLst>
       <p:ext uri="{BB962C8B-B14F-4D97-AF65-F5344CB8AC3E}">
-        <p14:creationId xmlns:p14="http://schemas.microsoft.com/office/powerpoint/2010/main" val="1194160605"/>
+        <p14:creationId xmlns:p14="http://schemas.microsoft.com/office/powerpoint/2010/main" val="3283837592"/>
       </p:ext>
     </p:extLst>
   </p:cSld>
@@ -3315,7 +3423,38 @@
           <a:p>
             <a:r>
               <a:rPr lang="en-US" dirty="0"/>
-              <a:t>I’ve tried to get a lot of scores in the hopes that the wisdom of crowds would approximate an objective pass/fail</a:t>
+              <a:t>The are just extremely sophisticated statistical models that mimic human speech</a:t>
+            </a:r>
+          </a:p>
+          <a:p>
+            <a:endParaRPr lang="en-US" dirty="0"/>
+          </a:p>
+          <a:p>
+            <a:r>
+              <a:rPr lang="en-US" dirty="0"/>
+              <a:t>A study where they asked Google’s BERT LLM to make logical inferences found that it made the correct inference 77% of the time</a:t>
+            </a:r>
+          </a:p>
+          <a:p>
+            <a:r>
+              <a:rPr lang="en-US" dirty="0"/>
+              <a:t>But when the finessed the prompts to remove simple </a:t>
+            </a:r>
+            <a:r>
+              <a:rPr lang="en-US" dirty="0" err="1"/>
+              <a:t>syntactice</a:t>
+            </a:r>
+            <a:r>
+              <a:rPr lang="en-US" dirty="0"/>
+              <a:t> clues like negating claims, </a:t>
+            </a:r>
+            <a:r>
+              <a:rPr lang="en-US" dirty="0" err="1"/>
+              <a:t>accuracty</a:t>
+            </a:r>
+            <a:r>
+              <a:rPr lang="en-US" dirty="0"/>
+              <a:t> dropped to 77%</a:t>
             </a:r>
           </a:p>
         </p:txBody>
@@ -3337,7 +3476,7 @@
           <a:p>
             <a:fld id="{3E71ED60-034F-453E-A170-8B332E4706A7}" type="slidenum">
               <a:rPr lang="en-US" smtClean="0"/>
-              <a:t>18</a:t>
+              <a:t>14</a:t>
             </a:fld>
             <a:endParaRPr lang="en-US"/>
           </a:p>
@@ -3346,7 +3485,7 @@
     </p:spTree>
     <p:extLst>
       <p:ext uri="{BB962C8B-B14F-4D97-AF65-F5344CB8AC3E}">
-        <p14:creationId xmlns:p14="http://schemas.microsoft.com/office/powerpoint/2010/main" val="2088953230"/>
+        <p14:creationId xmlns:p14="http://schemas.microsoft.com/office/powerpoint/2010/main" val="1194160605"/>
       </p:ext>
     </p:extLst>
   </p:cSld>
@@ -16863,7 +17002,7 @@
         <p:spPr>
           <a:xfrm>
             <a:off x="872400" y="1815525"/>
-            <a:ext cx="10728322" cy="5016758"/>
+            <a:ext cx="10728322" cy="4524315"/>
           </a:xfrm>
           <a:prstGeom prst="rect">
             <a:avLst/>
@@ -16939,10 +17078,7 @@
               <a:buFont typeface="Wingdings" panose="05000000000000000000" pitchFamily="2" charset="2"/>
               <a:buChar char="Ø"/>
             </a:pPr>
-            <a:r>
-              <a:rPr lang="en-US" sz="3200" dirty="0"/>
-              <a:t>Not a simple, clear test</a:t>
-            </a:r>
+            <a:endParaRPr lang="en-US" sz="2800" dirty="0"/>
           </a:p>
           <a:p>
             <a:pPr marL="914400" lvl="1" indent="-457200">
@@ -16951,12 +17087,44 @@
             </a:pPr>
             <a:endParaRPr lang="en-US" sz="2800" dirty="0"/>
           </a:p>
-          <a:p>
-            <a:pPr marL="914400" lvl="1" indent="-457200">
+        </p:txBody>
+      </p:sp>
+      <p:sp>
+        <p:nvSpPr>
+          <p:cNvPr id="2" name="TextBox 1">
+            <a:extLst>
+              <a:ext uri="{FF2B5EF4-FFF2-40B4-BE49-F238E27FC236}">
+                <a16:creationId xmlns:a16="http://schemas.microsoft.com/office/drawing/2014/main" id="{858DB8BF-AE50-A8AD-8590-E8053E707A6E}"/>
+              </a:ext>
+            </a:extLst>
+          </p:cNvPr>
+          <p:cNvSpPr txBox="1"/>
+          <p:nvPr/>
+        </p:nvSpPr>
+        <p:spPr>
+          <a:xfrm>
+            <a:off x="872400" y="5378514"/>
+            <a:ext cx="10728322" cy="584775"/>
+          </a:xfrm>
+          <a:prstGeom prst="rect">
+            <a:avLst/>
+          </a:prstGeom>
+          <a:noFill/>
+        </p:spPr>
+        <p:txBody>
+          <a:bodyPr wrap="square" rtlCol="0">
+            <a:spAutoFit/>
+          </a:bodyPr>
+          <a:lstStyle/>
+          <a:p>
+            <a:pPr marL="571500" indent="-571500">
               <a:buFont typeface="Wingdings" panose="05000000000000000000" pitchFamily="2" charset="2"/>
               <a:buChar char="Ø"/>
             </a:pPr>
-            <a:endParaRPr lang="en-US" sz="2800" dirty="0"/>
+            <a:r>
+              <a:rPr lang="en-US" sz="3200" dirty="0"/>
+              <a:t>Not a simple, clear test</a:t>
+            </a:r>
           </a:p>
         </p:txBody>
       </p:sp>
@@ -17553,9 +17721,9 @@
                                           </p:stCondLst>
                                         </p:cTn>
                                         <p:tgtEl>
-                                          <p:spTgt spid="5">
-                                            <p:txEl>
-                                              <p:pRg st="7" end="7"/>
+                                          <p:spTgt spid="2">
+                                            <p:txEl>
+                                              <p:pRg st="0" end="0"/>
                                             </p:txEl>
                                           </p:spTgt>
                                         </p:tgtEl>
@@ -17571,9 +17739,9 @@
                                       <p:cBhvr>
                                         <p:cTn id="52" dur="500"/>
                                         <p:tgtEl>
-                                          <p:spTgt spid="5">
-                                            <p:txEl>
-                                              <p:pRg st="7" end="7"/>
+                                          <p:spTgt spid="2">
+                                            <p:txEl>
+                                              <p:pRg st="0" end="0"/>
                                             </p:txEl>
                                           </p:spTgt>
                                         </p:tgtEl>
@@ -19327,7 +19495,7 @@
           <a:p>
             <a:r>
               <a:rPr lang="en-US" sz="4000" dirty="0"/>
-              <a:t>AI Thesis:</a:t>
+              <a:t>Strong AI Thesis:</a:t>
             </a:r>
           </a:p>
           <a:p>
@@ -24406,7 +24574,7 @@
         <p:spPr>
           <a:xfrm>
             <a:off x="872400" y="1566514"/>
-            <a:ext cx="10728322" cy="3231654"/>
+            <a:ext cx="10728322" cy="3539430"/>
           </a:xfrm>
           <a:prstGeom prst="rect">
             <a:avLst/>
@@ -24428,7 +24596,13 @@
             </a:r>
           </a:p>
           <a:p>
-            <a:endParaRPr lang="en-US" sz="3600" dirty="0"/>
+            <a:endParaRPr lang="en-US" sz="2800" dirty="0"/>
+          </a:p>
+          <a:p>
+            <a:r>
+              <a:rPr lang="en-US" sz="2800" dirty="0"/>
+              <a:t>Available at: https://github.com/nickspeelman/CRA_bot</a:t>
+            </a:r>
           </a:p>
         </p:txBody>
       </p:sp>
@@ -24731,6 +24905,67 @@
                                           <p:spTgt spid="5">
                                             <p:txEl>
                                               <p:pRg st="0" end="0"/>
+                                            </p:txEl>
+                                          </p:spTgt>
+                                        </p:tgtEl>
+                                      </p:cBhvr>
+                                    </p:animEffect>
+                                  </p:childTnLst>
+                                </p:cTn>
+                              </p:par>
+                            </p:childTnLst>
+                          </p:cTn>
+                        </p:par>
+                      </p:childTnLst>
+                    </p:cTn>
+                  </p:par>
+                  <p:par>
+                    <p:cTn id="23" fill="hold">
+                      <p:stCondLst>
+                        <p:cond delay="indefinite"/>
+                      </p:stCondLst>
+                      <p:childTnLst>
+                        <p:par>
+                          <p:cTn id="24" fill="hold">
+                            <p:stCondLst>
+                              <p:cond delay="0"/>
+                            </p:stCondLst>
+                            <p:childTnLst>
+                              <p:par>
+                                <p:cTn id="25" presetID="14" presetClass="entr" presetSubtype="10" fill="hold" nodeType="clickEffect">
+                                  <p:stCondLst>
+                                    <p:cond delay="0"/>
+                                  </p:stCondLst>
+                                  <p:childTnLst>
+                                    <p:set>
+                                      <p:cBhvr>
+                                        <p:cTn id="26" dur="1" fill="hold">
+                                          <p:stCondLst>
+                                            <p:cond delay="0"/>
+                                          </p:stCondLst>
+                                        </p:cTn>
+                                        <p:tgtEl>
+                                          <p:spTgt spid="5">
+                                            <p:txEl>
+                                              <p:pRg st="2" end="2"/>
+                                            </p:txEl>
+                                          </p:spTgt>
+                                        </p:tgtEl>
+                                        <p:attrNameLst>
+                                          <p:attrName>style.visibility</p:attrName>
+                                        </p:attrNameLst>
+                                      </p:cBhvr>
+                                      <p:to>
+                                        <p:strVal val="visible"/>
+                                      </p:to>
+                                    </p:set>
+                                    <p:animEffect transition="in" filter="randombar(horizontal)">
+                                      <p:cBhvr>
+                                        <p:cTn id="27" dur="500"/>
+                                        <p:tgtEl>
+                                          <p:spTgt spid="5">
+                                            <p:txEl>
+                                              <p:pRg st="2" end="2"/>
                                             </p:txEl>
                                           </p:spTgt>
                                         </p:tgtEl>
@@ -25271,7 +25506,7 @@
           <a:p>
             <a:r>
               <a:rPr lang="en-US" sz="2800" dirty="0"/>
-              <a:t>AI Thesis:</a:t>
+              <a:t>Strong AI Thesis:</a:t>
             </a:r>
           </a:p>
           <a:p>
@@ -31640,7 +31875,7 @@
             </a:br>
             <a:r>
               <a:rPr lang="en-US" sz="2400" dirty="0"/>
-              <a:t>For the bots “understanding” is a  an act of finding meaning in a linguistic sense.</a:t>
+              <a:t>For the bots “understanding” is an act of finding meaning in a linguistic sense.</a:t>
             </a:r>
           </a:p>
         </p:txBody>
@@ -38341,7 +38576,7 @@
           <a:p>
             <a:r>
               <a:rPr lang="en-US" sz="3600" dirty="0"/>
-              <a:t>		Minds are essentially computational 			machines, therefore minds can arise in		any computational machine. (Rescorla)</a:t>
+              <a:t>		Minds are essentially computational 			machines; therefore, minds can arise in		any computational machine. (Rescorla)</a:t>
             </a:r>
           </a:p>
         </p:txBody>

</xml_diff>